<commit_message>
Updated Powerpoint with Early Development Section
</commit_message>
<xml_diff>
--- a/JPLFinalPresentation.pptx
+++ b/JPLFinalPresentation.pptx
@@ -7,10 +7,10 @@
     <p:sldMasterId id="2147483736" r:id="rId3"/>
   </p:sldMasterIdLst>
   <p:notesMasterIdLst>
-    <p:notesMasterId r:id="rId32"/>
+    <p:notesMasterId r:id="rId37"/>
   </p:notesMasterIdLst>
   <p:handoutMasterIdLst>
-    <p:handoutMasterId r:id="rId33"/>
+    <p:handoutMasterId r:id="rId38"/>
   </p:handoutMasterIdLst>
   <p:sldIdLst>
     <p:sldId id="444" r:id="rId4"/>
@@ -20,27 +20,32 @@
     <p:sldId id="495" r:id="rId8"/>
     <p:sldId id="494" r:id="rId9"/>
     <p:sldId id="472" r:id="rId10"/>
-    <p:sldId id="473" r:id="rId11"/>
-    <p:sldId id="475" r:id="rId12"/>
-    <p:sldId id="476" r:id="rId13"/>
-    <p:sldId id="477" r:id="rId14"/>
-    <p:sldId id="478" r:id="rId15"/>
-    <p:sldId id="479" r:id="rId16"/>
-    <p:sldId id="480" r:id="rId17"/>
-    <p:sldId id="481" r:id="rId18"/>
-    <p:sldId id="482" r:id="rId19"/>
-    <p:sldId id="483" r:id="rId20"/>
-    <p:sldId id="484" r:id="rId21"/>
-    <p:sldId id="485" r:id="rId22"/>
-    <p:sldId id="486" r:id="rId23"/>
-    <p:sldId id="487" r:id="rId24"/>
-    <p:sldId id="488" r:id="rId25"/>
-    <p:sldId id="489" r:id="rId26"/>
-    <p:sldId id="490" r:id="rId27"/>
-    <p:sldId id="491" r:id="rId28"/>
-    <p:sldId id="492" r:id="rId29"/>
-    <p:sldId id="493" r:id="rId30"/>
-    <p:sldId id="460" r:id="rId31"/>
+    <p:sldId id="498" r:id="rId11"/>
+    <p:sldId id="473" r:id="rId12"/>
+    <p:sldId id="499" r:id="rId13"/>
+    <p:sldId id="500" r:id="rId14"/>
+    <p:sldId id="501" r:id="rId15"/>
+    <p:sldId id="475" r:id="rId16"/>
+    <p:sldId id="502" r:id="rId17"/>
+    <p:sldId id="476" r:id="rId18"/>
+    <p:sldId id="477" r:id="rId19"/>
+    <p:sldId id="478" r:id="rId20"/>
+    <p:sldId id="479" r:id="rId21"/>
+    <p:sldId id="480" r:id="rId22"/>
+    <p:sldId id="481" r:id="rId23"/>
+    <p:sldId id="482" r:id="rId24"/>
+    <p:sldId id="483" r:id="rId25"/>
+    <p:sldId id="484" r:id="rId26"/>
+    <p:sldId id="485" r:id="rId27"/>
+    <p:sldId id="486" r:id="rId28"/>
+    <p:sldId id="487" r:id="rId29"/>
+    <p:sldId id="488" r:id="rId30"/>
+    <p:sldId id="489" r:id="rId31"/>
+    <p:sldId id="490" r:id="rId32"/>
+    <p:sldId id="491" r:id="rId33"/>
+    <p:sldId id="492" r:id="rId34"/>
+    <p:sldId id="493" r:id="rId35"/>
+    <p:sldId id="460" r:id="rId36"/>
   </p:sldIdLst>
   <p:sldSz cx="9144000" cy="5143500" type="screen16x9"/>
   <p:notesSz cx="6858000" cy="9144000"/>
@@ -229,7 +234,7 @@
                 <a:latin typeface="Arial"/>
               </a:rPr>
               <a:pPr/>
-              <a:t>5/19/2017</a:t>
+              <a:t>5/20/2017</a:t>
             </a:fld>
             <a:endParaRPr lang="en-US" dirty="0">
               <a:latin typeface="Arial"/>
@@ -409,7 +414,7 @@
             <a:fld id="{2CD6293C-6F3F-374D-A003-D3E152FC3744}" type="datetimeFigureOut">
               <a:rPr lang="en-US" smtClean="0"/>
               <a:pPr/>
-              <a:t>5/19/2017</a:t>
+              <a:t>5/20/2017</a:t>
             </a:fld>
             <a:endParaRPr lang="en-US" dirty="0"/>
           </a:p>
@@ -9888,7 +9893,62 @@
           <a:bodyPr/>
           <a:lstStyle/>
           <a:p>
-            <a:endParaRPr lang="en-US" sz="2400" dirty="0"/>
+            <a:r>
+              <a:rPr lang="en-US" sz="2400" dirty="0" smtClean="0"/>
+              <a:t>The Queue module allows you to create a new queue object that can hold a specific number of items. </a:t>
+            </a:r>
+          </a:p>
+          <a:p>
+            <a:r>
+              <a:rPr lang="en-US" sz="2400" dirty="0" smtClean="0"/>
+              <a:t>We use these following methods to control the Queue:</a:t>
+            </a:r>
+          </a:p>
+          <a:p>
+            <a:pPr lvl="1"/>
+            <a:r>
+              <a:rPr lang="en-US" sz="2000" b="1" dirty="0" smtClean="0"/>
+              <a:t>put</a:t>
+            </a:r>
+            <a:r>
+              <a:rPr lang="en-US" sz="2000" b="1" dirty="0" smtClean="0"/>
+              <a:t>():</a:t>
+            </a:r>
+            <a:r>
+              <a:rPr lang="en-US" sz="2000" dirty="0" smtClean="0"/>
+              <a:t> </a:t>
+            </a:r>
+            <a:r>
+              <a:rPr lang="en-US" sz="2000" dirty="0" smtClean="0"/>
+              <a:t>adds items to a </a:t>
+            </a:r>
+            <a:r>
+              <a:rPr lang="en-US" sz="2000" dirty="0" smtClean="0"/>
+              <a:t>queue</a:t>
+            </a:r>
+          </a:p>
+          <a:p>
+            <a:pPr lvl="1"/>
+            <a:r>
+              <a:rPr lang="en-US" sz="2000" b="1" dirty="0" smtClean="0"/>
+              <a:t>empty():</a:t>
+            </a:r>
+            <a:r>
+              <a:rPr lang="en-US" sz="2000" dirty="0" smtClean="0"/>
+              <a:t> returns True if queue is empty; otherwise, False  </a:t>
+            </a:r>
+          </a:p>
+          <a:p>
+            <a:pPr lvl="1"/>
+            <a:r>
+              <a:rPr lang="en-US" sz="2000" b="1" dirty="0" smtClean="0"/>
+              <a:t>get()</a:t>
+            </a:r>
+            <a:r>
+              <a:rPr lang="en-US" sz="2000" dirty="0" smtClean="0"/>
+              <a:t>: removes and returns an item from the queue</a:t>
+            </a:r>
+            <a:endParaRPr lang="en-US" sz="2000" dirty="0"/>
           </a:p>
         </p:txBody>
       </p:sp>
@@ -9908,22 +9968,10 @@
           <a:lstStyle/>
           <a:p>
             <a:r>
-              <a:rPr lang="en-US" sz="3200" dirty="0" smtClean="0">
-                <a:solidFill>
-                  <a:schemeClr val="accent2">
-                    <a:lumMod val="75000"/>
-                  </a:schemeClr>
-                </a:solidFill>
-              </a:rPr>
-              <a:t>Building and Testing</a:t>
-            </a:r>
-            <a:endParaRPr lang="en-US" sz="3200" dirty="0">
-              <a:solidFill>
-                <a:schemeClr val="accent2">
-                  <a:lumMod val="75000"/>
-                </a:schemeClr>
-              </a:solidFill>
-            </a:endParaRPr>
+              <a:rPr lang="en-US" sz="3200" dirty="0" smtClean="0"/>
+              <a:t>Python Multithreaded Queue</a:t>
+            </a:r>
+            <a:endParaRPr lang="en-US" sz="3200" dirty="0"/>
           </a:p>
         </p:txBody>
       </p:sp>
@@ -10021,6 +10069,67 @@
           <a:bodyPr/>
           <a:lstStyle/>
           <a:p>
+            <a:r>
+              <a:rPr lang="en-US" sz="2400" dirty="0" smtClean="0"/>
+              <a:t>In </a:t>
+            </a:r>
+            <a:r>
+              <a:rPr lang="en-US" sz="2400" dirty="0" err="1" smtClean="0"/>
+              <a:t>Supro</a:t>
+            </a:r>
+            <a:r>
+              <a:rPr lang="en-US" sz="2400" dirty="0" smtClean="0"/>
+              <a:t> we have two queues that transfer messages between the front end and the back end.</a:t>
+            </a:r>
+          </a:p>
+          <a:p>
+            <a:r>
+              <a:rPr lang="en-US" sz="2400" b="1" dirty="0" smtClean="0"/>
+              <a:t>_</a:t>
+            </a:r>
+            <a:r>
+              <a:rPr lang="en-US" sz="2400" b="1" dirty="0" err="1" smtClean="0"/>
+              <a:t>supervisor_update_q</a:t>
+            </a:r>
+            <a:r>
+              <a:rPr lang="en-US" sz="2400" b="1" dirty="0" smtClean="0"/>
+              <a:t>: </a:t>
+            </a:r>
+            <a:r>
+              <a:rPr lang="en-US" sz="2400" dirty="0" smtClean="0"/>
+              <a:t>Adds the state and process info of a supervisor instance to the queue and sends it to the </a:t>
+            </a:r>
+            <a:r>
+              <a:rPr lang="en-US" sz="2400" dirty="0" err="1" smtClean="0"/>
+              <a:t>ui</a:t>
+            </a:r>
+            <a:r>
+              <a:rPr lang="en-US" sz="2400" dirty="0" smtClean="0"/>
+              <a:t>. </a:t>
+            </a:r>
+          </a:p>
+          <a:p>
+            <a:r>
+              <a:rPr lang="en-US" sz="2400" b="1" dirty="0" smtClean="0"/>
+              <a:t>_</a:t>
+            </a:r>
+            <a:r>
+              <a:rPr lang="en-US" sz="2400" b="1" dirty="0" err="1" smtClean="0"/>
+              <a:t>messages_to_backend_q</a:t>
+            </a:r>
+            <a:r>
+              <a:rPr lang="en-US" sz="2400" b="1" dirty="0" smtClean="0"/>
+              <a:t>: </a:t>
+            </a:r>
+            <a:r>
+              <a:rPr lang="en-US" sz="2400" dirty="0" smtClean="0"/>
+              <a:t>Adds messages in the form of commands from the UI and sends it to the backend.</a:t>
+            </a:r>
+          </a:p>
+          <a:p>
+            <a:endParaRPr lang="en-US" sz="1600" b="1" dirty="0" smtClean="0"/>
+          </a:p>
+          <a:p>
             <a:endParaRPr lang="en-US" sz="2400" dirty="0"/>
           </a:p>
         </p:txBody>
@@ -10041,16 +10150,12 @@
           <a:lstStyle/>
           <a:p>
             <a:r>
+              <a:rPr lang="en-US" sz="3200" dirty="0" err="1" smtClean="0"/>
+              <a:t>Supro</a:t>
+            </a:r>
+            <a:r>
               <a:rPr lang="en-US" sz="3200" dirty="0" smtClean="0"/>
-              <a:t>First </a:t>
-            </a:r>
-            <a:r>
-              <a:rPr lang="en-US" sz="3200" dirty="0" err="1" smtClean="0"/>
-              <a:t>Websocket</a:t>
-            </a:r>
-            <a:r>
-              <a:rPr lang="en-US" sz="3200" dirty="0" smtClean="0"/>
-              <a:t> Class</a:t>
+              <a:t> Queue</a:t>
             </a:r>
             <a:endParaRPr lang="en-US" sz="3200" dirty="0"/>
           </a:p>
@@ -10150,7 +10255,123 @@
           <a:bodyPr/>
           <a:lstStyle/>
           <a:p>
-            <a:endParaRPr lang="en-US" sz="2400" dirty="0"/>
+            <a:r>
+              <a:rPr lang="en-US" sz="2400" dirty="0" err="1" smtClean="0"/>
+              <a:t>Supro</a:t>
+            </a:r>
+            <a:r>
+              <a:rPr lang="en-US" sz="2400" dirty="0" smtClean="0"/>
+              <a:t> classes that implement threading module:</a:t>
+            </a:r>
+          </a:p>
+          <a:p>
+            <a:pPr lvl="1"/>
+            <a:r>
+              <a:rPr lang="en-US" sz="2000" b="1" dirty="0" err="1" smtClean="0"/>
+              <a:t>SuproProcessor</a:t>
+            </a:r>
+            <a:r>
+              <a:rPr lang="en-US" sz="2000" b="1" dirty="0" smtClean="0"/>
+              <a:t> </a:t>
+            </a:r>
+            <a:r>
+              <a:rPr lang="en-US" sz="2000" b="1" dirty="0" smtClean="0"/>
+              <a:t>– </a:t>
+            </a:r>
+            <a:r>
+              <a:rPr lang="en-US" sz="2000" dirty="0" smtClean="0"/>
+              <a:t>maintains a connection between supervisor on a single machine and </a:t>
+            </a:r>
+            <a:r>
+              <a:rPr lang="en-US" sz="2000" dirty="0" err="1" smtClean="0"/>
+              <a:t>Supro</a:t>
+            </a:r>
+            <a:r>
+              <a:rPr lang="en-US" sz="2000" dirty="0" smtClean="0"/>
+              <a:t>. </a:t>
+            </a:r>
+          </a:p>
+          <a:p>
+            <a:pPr marL="1257300" lvl="2" indent="-342900">
+              <a:buFont typeface="+mj-lt"/>
+              <a:buAutoNum type="arabicPeriod"/>
+            </a:pPr>
+            <a:r>
+              <a:rPr lang="en-US" sz="1600" dirty="0" smtClean="0"/>
+              <a:t>Connect to supervisor if connection has not yet been made or is lost</a:t>
+            </a:r>
+          </a:p>
+          <a:p>
+            <a:pPr marL="1257300" lvl="2" indent="-342900">
+              <a:buFont typeface="+mj-lt"/>
+              <a:buAutoNum type="arabicPeriod"/>
+            </a:pPr>
+            <a:r>
+              <a:rPr lang="en-US" sz="1600" dirty="0" smtClean="0"/>
+              <a:t>Send supervisor status updates to the UI</a:t>
+            </a:r>
+          </a:p>
+          <a:p>
+            <a:pPr marL="1257300" lvl="2" indent="-342900">
+              <a:buFont typeface="+mj-lt"/>
+              <a:buAutoNum type="arabicPeriod"/>
+            </a:pPr>
+            <a:r>
+              <a:rPr lang="en-US" sz="1600" dirty="0" smtClean="0"/>
+              <a:t>Report a loss of connection to the UI if unable to reach supervisor</a:t>
+            </a:r>
+          </a:p>
+          <a:p>
+            <a:pPr marL="857250" lvl="1" indent="-342900"/>
+            <a:r>
+              <a:rPr lang="en-US" sz="2000" b="1" dirty="0" err="1" smtClean="0"/>
+              <a:t>SuproSwarm</a:t>
+            </a:r>
+            <a:r>
+              <a:rPr lang="en-US" sz="2000" dirty="0" smtClean="0"/>
+              <a:t> – creates and manages all ‘swarm entities’.</a:t>
+            </a:r>
+          </a:p>
+          <a:p>
+            <a:pPr marL="1257300" lvl="2" indent="-342900">
+              <a:buFont typeface="+mj-lt"/>
+              <a:buAutoNum type="arabicPeriod"/>
+            </a:pPr>
+            <a:r>
+              <a:rPr lang="en-US" sz="1600" dirty="0" smtClean="0"/>
+              <a:t>Get next message from UI and process its command</a:t>
+            </a:r>
+          </a:p>
+          <a:p>
+            <a:pPr marL="1257300" lvl="2" indent="-342900">
+              <a:buFont typeface="+mj-lt"/>
+              <a:buAutoNum type="arabicPeriod"/>
+            </a:pPr>
+            <a:r>
+              <a:rPr lang="en-US" sz="1600" dirty="0" smtClean="0"/>
+              <a:t>See if any processor threads have crashed and restart them if they have</a:t>
+            </a:r>
+          </a:p>
+          <a:p>
+            <a:pPr marL="1257300" lvl="2" indent="-342900">
+              <a:buFont typeface="+mj-lt"/>
+              <a:buAutoNum type="arabicPeriod"/>
+            </a:pPr>
+            <a:r>
+              <a:rPr lang="en-US" sz="1600" dirty="0" smtClean="0"/>
+              <a:t>Execute command on appropriate swarm entity</a:t>
+            </a:r>
+          </a:p>
+          <a:p>
+            <a:pPr marL="1257300" lvl="2" indent="-342900">
+              <a:buFont typeface="+mj-lt"/>
+              <a:buAutoNum type="arabicPeriod"/>
+            </a:pPr>
+            <a:r>
+              <a:rPr lang="en-US" sz="1600" dirty="0" smtClean="0"/>
+              <a:t>Broadcast swarm status updates</a:t>
+            </a:r>
+            <a:endParaRPr lang="en-US" sz="1600" dirty="0" smtClean="0"/>
           </a:p>
         </p:txBody>
       </p:sp>
@@ -10170,8 +10391,12 @@
           <a:lstStyle/>
           <a:p>
             <a:r>
+              <a:rPr lang="en-US" sz="3200" dirty="0" err="1" smtClean="0"/>
+              <a:t>Supro</a:t>
+            </a:r>
+            <a:r>
               <a:rPr lang="en-US" sz="3200" dirty="0" smtClean="0"/>
-              <a:t>Incorporating the Front-end</a:t>
+              <a:t> Multithreading</a:t>
             </a:r>
             <a:endParaRPr lang="en-US" sz="3200" dirty="0"/>
           </a:p>
@@ -10271,6 +10496,36 @@
           <a:bodyPr/>
           <a:lstStyle/>
           <a:p>
+            <a:r>
+              <a:rPr lang="en-US" sz="2400" dirty="0" smtClean="0"/>
+              <a:t>When exchanging data between a browser and a server, the data can only be text. </a:t>
+            </a:r>
+          </a:p>
+          <a:p>
+            <a:r>
+              <a:rPr lang="en-US" sz="2400" b="1" dirty="0" smtClean="0"/>
+              <a:t>Sending Data: </a:t>
+            </a:r>
+            <a:r>
+              <a:rPr lang="en-US" sz="2400" dirty="0" smtClean="0"/>
+              <a:t>JavaScript objects can be converted into JSON to be sent to the server. </a:t>
+            </a:r>
+          </a:p>
+          <a:p>
+            <a:r>
+              <a:rPr lang="en-US" sz="2400" b="1" dirty="0" smtClean="0"/>
+              <a:t>Receiving Data:</a:t>
+            </a:r>
+            <a:r>
+              <a:rPr lang="en-US" sz="2400" dirty="0" smtClean="0"/>
+              <a:t> JSON received from the server can be converted into JavaScript objects. </a:t>
+            </a:r>
+          </a:p>
+          <a:p>
+            <a:r>
+              <a:rPr lang="en-US" sz="2400" dirty="0" smtClean="0"/>
+              <a:t>Since JSON format is text only, it can be easily sent to and from a server, and used as a data format by any programming language.</a:t>
+            </a:r>
             <a:endParaRPr lang="en-US" sz="2400" dirty="0"/>
           </a:p>
         </p:txBody>
@@ -10292,7 +10547,7 @@
           <a:p>
             <a:r>
               <a:rPr lang="en-US" sz="3200" dirty="0" smtClean="0"/>
-              <a:t>Building RPMs</a:t>
+              <a:t>JSON</a:t>
             </a:r>
             <a:endParaRPr lang="en-US" sz="3200" dirty="0"/>
           </a:p>
@@ -10385,12 +10640,24 @@
         <p:spPr>
           <a:xfrm>
             <a:off x="341088" y="967741"/>
-            <a:ext cx="8364762" cy="3751898"/>
-          </a:xfrm>
-        </p:spPr>
-        <p:txBody>
-          <a:bodyPr/>
-          <a:lstStyle/>
+            <a:ext cx="5008152" cy="3751898"/>
+          </a:xfrm>
+        </p:spPr>
+        <p:txBody>
+          <a:bodyPr/>
+          <a:lstStyle/>
+          <a:p>
+            <a:r>
+              <a:rPr lang="en-US" sz="2400" dirty="0" smtClean="0"/>
+              <a:t>This is the update message in JSON format that is sent to the UI by each supervisor instance.</a:t>
+            </a:r>
+          </a:p>
+          <a:p>
+            <a:r>
+              <a:rPr lang="en-US" sz="2400" dirty="0" smtClean="0"/>
+              <a:t>The message includes supervisor state and process information.</a:t>
+            </a:r>
+          </a:p>
           <a:p>
             <a:endParaRPr lang="en-US" sz="2400" dirty="0"/>
           </a:p>
@@ -10412,22 +10679,14 @@
           <a:lstStyle/>
           <a:p>
             <a:r>
-              <a:rPr lang="en-US" sz="3200" dirty="0" smtClean="0">
-                <a:solidFill>
-                  <a:schemeClr val="accent2">
-                    <a:lumMod val="75000"/>
-                  </a:schemeClr>
-                </a:solidFill>
-              </a:rPr>
-              <a:t>New Features</a:t>
-            </a:r>
-            <a:endParaRPr lang="en-US" sz="3200" dirty="0">
-              <a:solidFill>
-                <a:schemeClr val="accent2">
-                  <a:lumMod val="75000"/>
-                </a:schemeClr>
-              </a:solidFill>
-            </a:endParaRPr>
+              <a:rPr lang="en-US" sz="3200" dirty="0" err="1" smtClean="0"/>
+              <a:t>Supro</a:t>
+            </a:r>
+            <a:r>
+              <a:rPr lang="en-US" sz="3200" dirty="0" smtClean="0"/>
+              <a:t> JSON</a:t>
+            </a:r>
+            <a:endParaRPr lang="en-US" sz="3200" dirty="0"/>
           </a:p>
         </p:txBody>
       </p:sp>
@@ -10480,6 +10739,30 @@
           </a:p>
         </p:txBody>
       </p:sp>
+      <p:pic>
+        <p:nvPicPr>
+          <p:cNvPr id="9" name="Picture 8" descr="update_message.png"/>
+          <p:cNvPicPr>
+            <a:picLocks noChangeAspect="1"/>
+          </p:cNvPicPr>
+          <p:nvPr/>
+        </p:nvPicPr>
+        <p:blipFill>
+          <a:blip r:embed="rId2"/>
+          <a:stretch>
+            <a:fillRect/>
+          </a:stretch>
+        </p:blipFill>
+        <p:spPr>
+          <a:xfrm>
+            <a:off x="5463540" y="394068"/>
+            <a:ext cx="3242310" cy="4412522"/>
+          </a:xfrm>
+          <a:prstGeom prst="rect">
+            <a:avLst/>
+          </a:prstGeom>
+        </p:spPr>
+      </p:pic>
     </p:spTree>
   </p:cSld>
   <p:clrMapOvr>
@@ -10545,10 +10828,22 @@
           <a:lstStyle/>
           <a:p>
             <a:r>
-              <a:rPr lang="en-US" sz="3200" dirty="0" smtClean="0"/>
-              <a:t>Stop/Start/Restart All</a:t>
-            </a:r>
-            <a:endParaRPr lang="en-US" sz="3200" dirty="0"/>
+              <a:rPr lang="en-US" sz="3200" dirty="0" smtClean="0">
+                <a:solidFill>
+                  <a:schemeClr val="accent2">
+                    <a:lumMod val="75000"/>
+                  </a:schemeClr>
+                </a:solidFill>
+              </a:rPr>
+              <a:t>Building and Testing</a:t>
+            </a:r>
+            <a:endParaRPr lang="en-US" sz="3200" dirty="0">
+              <a:solidFill>
+                <a:schemeClr val="accent2">
+                  <a:lumMod val="75000"/>
+                </a:schemeClr>
+              </a:solidFill>
+            </a:endParaRPr>
           </a:p>
         </p:txBody>
       </p:sp>
@@ -10667,7 +10962,15 @@
           <a:p>
             <a:r>
               <a:rPr lang="en-US" sz="3200" dirty="0" smtClean="0"/>
-              <a:t>Logging</a:t>
+              <a:t>First </a:t>
+            </a:r>
+            <a:r>
+              <a:rPr lang="en-US" sz="3200" dirty="0" err="1" smtClean="0"/>
+              <a:t>Websocket</a:t>
+            </a:r>
+            <a:r>
+              <a:rPr lang="en-US" sz="3200" dirty="0" smtClean="0"/>
+              <a:t> Class</a:t>
             </a:r>
             <a:endParaRPr lang="en-US" sz="3200" dirty="0"/>
           </a:p>
@@ -10787,8 +11090,8 @@
           <a:lstStyle/>
           <a:p>
             <a:r>
-              <a:rPr lang="en-US" sz="3200" dirty="0" err="1" smtClean="0"/>
-              <a:t>Testbeds</a:t>
+              <a:rPr lang="en-US" sz="3200" dirty="0" smtClean="0"/>
+              <a:t>Incorporating the Front-end</a:t>
             </a:r>
             <a:endParaRPr lang="en-US" sz="3200" dirty="0"/>
           </a:p>
@@ -10908,22 +11211,10 @@
           <a:lstStyle/>
           <a:p>
             <a:r>
-              <a:rPr lang="en-US" sz="3200" dirty="0" err="1" smtClean="0">
-                <a:solidFill>
-                  <a:schemeClr val="accent2">
-                    <a:lumMod val="75000"/>
-                  </a:schemeClr>
-                </a:solidFill>
-              </a:rPr>
-              <a:t>Refactor</a:t>
-            </a:r>
-            <a:endParaRPr lang="en-US" sz="3200" dirty="0">
-              <a:solidFill>
-                <a:schemeClr val="accent2">
-                  <a:lumMod val="75000"/>
-                </a:schemeClr>
-              </a:solidFill>
-            </a:endParaRPr>
+              <a:rPr lang="en-US" sz="3200" dirty="0" smtClean="0"/>
+              <a:t>Building RPMs</a:t>
+            </a:r>
+            <a:endParaRPr lang="en-US" sz="3200" dirty="0"/>
           </a:p>
         </p:txBody>
       </p:sp>
@@ -11021,6 +11312,26 @@
           <a:bodyPr/>
           <a:lstStyle/>
           <a:p>
+            <a:r>
+              <a:rPr lang="en-US" sz="2400" dirty="0" smtClean="0"/>
+              <a:t>Stop/Start/Restart All Buttons</a:t>
+            </a:r>
+          </a:p>
+          <a:p>
+            <a:r>
+              <a:rPr lang="en-US" sz="2400" dirty="0" smtClean="0"/>
+              <a:t>Logging</a:t>
+            </a:r>
+          </a:p>
+          <a:p>
+            <a:r>
+              <a:rPr lang="en-US" sz="2400" dirty="0" err="1" smtClean="0"/>
+              <a:t>Testbed</a:t>
+            </a:r>
+            <a:r>
+              <a:rPr lang="en-US" sz="2400" dirty="0" smtClean="0"/>
+              <a:t> Support</a:t>
+            </a:r>
             <a:endParaRPr lang="en-US" sz="2400" dirty="0"/>
           </a:p>
         </p:txBody>
@@ -11041,10 +11352,22 @@
           <a:lstStyle/>
           <a:p>
             <a:r>
-              <a:rPr lang="en-US" sz="3200" dirty="0" smtClean="0"/>
-              <a:t>Hierarchical Structure</a:t>
-            </a:r>
-            <a:endParaRPr lang="en-US" sz="3200" dirty="0"/>
+              <a:rPr lang="en-US" sz="3200" dirty="0" smtClean="0">
+                <a:solidFill>
+                  <a:schemeClr val="accent2">
+                    <a:lumMod val="75000"/>
+                  </a:schemeClr>
+                </a:solidFill>
+              </a:rPr>
+              <a:t>New Features</a:t>
+            </a:r>
+            <a:endParaRPr lang="en-US" sz="3200" dirty="0">
+              <a:solidFill>
+                <a:schemeClr val="accent2">
+                  <a:lumMod val="75000"/>
+                </a:schemeClr>
+              </a:solidFill>
+            </a:endParaRPr>
           </a:p>
         </p:txBody>
       </p:sp>
@@ -11352,15 +11675,7 @@
           <a:p>
             <a:r>
               <a:rPr lang="en-US" sz="3200" dirty="0" smtClean="0"/>
-              <a:t>Changing the </a:t>
-            </a:r>
-            <a:r>
-              <a:rPr lang="en-US" sz="3200" dirty="0" err="1" smtClean="0"/>
-              <a:t>web_socket</a:t>
-            </a:r>
-            <a:r>
-              <a:rPr lang="en-US" sz="3200" dirty="0" smtClean="0"/>
-              <a:t> class</a:t>
+              <a:t>Stop/Start/Restart All</a:t>
             </a:r>
             <a:endParaRPr lang="en-US" sz="3200" dirty="0"/>
           </a:p>
@@ -11481,7 +11796,7 @@
           <a:p>
             <a:r>
               <a:rPr lang="en-US" sz="3200" dirty="0" smtClean="0"/>
-              <a:t>Cleaning up the code</a:t>
+              <a:t>Logging</a:t>
             </a:r>
             <a:endParaRPr lang="en-US" sz="3200" dirty="0"/>
           </a:p>
@@ -11601,8 +11916,8 @@
           <a:lstStyle/>
           <a:p>
             <a:r>
-              <a:rPr lang="en-US" sz="3200" dirty="0" smtClean="0"/>
-              <a:t>Documentation</a:t>
+              <a:rPr lang="en-US" sz="3200" dirty="0" err="1" smtClean="0"/>
+              <a:t>Testbeds</a:t>
             </a:r>
             <a:endParaRPr lang="en-US" sz="3200" dirty="0"/>
           </a:p>
@@ -11722,14 +12037,14 @@
           <a:lstStyle/>
           <a:p>
             <a:r>
-              <a:rPr lang="en-US" sz="3200" dirty="0" smtClean="0">
+              <a:rPr lang="en-US" sz="3200" dirty="0" err="1" smtClean="0">
                 <a:solidFill>
                   <a:schemeClr val="accent2">
                     <a:lumMod val="75000"/>
                   </a:schemeClr>
                 </a:solidFill>
               </a:rPr>
-              <a:t>Conclusion</a:t>
+              <a:t>Refactor</a:t>
             </a:r>
             <a:endParaRPr lang="en-US" sz="3200" dirty="0">
               <a:solidFill>
@@ -11856,7 +12171,7 @@
           <a:p>
             <a:r>
               <a:rPr lang="en-US" sz="3200" dirty="0" smtClean="0"/>
-              <a:t>Things we learned</a:t>
+              <a:t>Hierarchical Structure</a:t>
             </a:r>
             <a:endParaRPr lang="en-US" sz="3200" dirty="0"/>
           </a:p>
@@ -11977,7 +12292,15 @@
           <a:p>
             <a:r>
               <a:rPr lang="en-US" sz="3200" dirty="0" smtClean="0"/>
-              <a:t>Challenges we faced</a:t>
+              <a:t>Changing the </a:t>
+            </a:r>
+            <a:r>
+              <a:rPr lang="en-US" sz="3200" dirty="0" err="1" smtClean="0"/>
+              <a:t>web_socket</a:t>
+            </a:r>
+            <a:r>
+              <a:rPr lang="en-US" sz="3200" dirty="0" smtClean="0"/>
+              <a:t> class</a:t>
             </a:r>
             <a:endParaRPr lang="en-US" sz="3200" dirty="0"/>
           </a:p>
@@ -12098,7 +12421,7 @@
           <a:p>
             <a:r>
               <a:rPr lang="en-US" sz="3200" dirty="0" smtClean="0"/>
-              <a:t>Final thoughts</a:t>
+              <a:t>Cleaning up the code</a:t>
             </a:r>
             <a:endParaRPr lang="en-US" sz="3200" dirty="0"/>
           </a:p>
@@ -12218,22 +12541,10 @@
           <a:lstStyle/>
           <a:p>
             <a:r>
-              <a:rPr lang="en-US" sz="3200" dirty="0" smtClean="0">
-                <a:solidFill>
-                  <a:schemeClr val="accent2">
-                    <a:lumMod val="75000"/>
-                  </a:schemeClr>
-                </a:solidFill>
-              </a:rPr>
-              <a:t>Acknowledgements</a:t>
-            </a:r>
-            <a:endParaRPr lang="en-US" sz="3200" dirty="0">
-              <a:solidFill>
-                <a:schemeClr val="accent2">
-                  <a:lumMod val="75000"/>
-                </a:schemeClr>
-              </a:solidFill>
-            </a:endParaRPr>
+              <a:rPr lang="en-US" sz="3200" dirty="0" smtClean="0"/>
+              <a:t>Documentation</a:t>
+            </a:r>
+            <a:endParaRPr lang="en-US" sz="3200" dirty="0"/>
           </a:p>
         </p:txBody>
       </p:sp>
@@ -12295,6 +12606,891 @@
 </file>
 
 <file path=ppt/slides/slide28.xml><?xml version="1.0" encoding="utf-8"?>
+<p:sld xmlns:a="http://schemas.openxmlformats.org/drawingml/2006/main" xmlns:r="http://schemas.openxmlformats.org/officeDocument/2006/relationships" xmlns:p="http://schemas.openxmlformats.org/presentationml/2006/main">
+  <p:cSld>
+    <p:spTree>
+      <p:nvGrpSpPr>
+        <p:cNvPr id="1" name=""/>
+        <p:cNvGrpSpPr/>
+        <p:nvPr/>
+      </p:nvGrpSpPr>
+      <p:grpSpPr>
+        <a:xfrm>
+          <a:off x="0" y="0"/>
+          <a:ext cx="0" cy="0"/>
+          <a:chOff x="0" y="0"/>
+          <a:chExt cx="0" cy="0"/>
+        </a:xfrm>
+      </p:grpSpPr>
+      <p:sp>
+        <p:nvSpPr>
+          <p:cNvPr id="2" name="Text Placeholder 1"/>
+          <p:cNvSpPr>
+            <a:spLocks noGrp="1"/>
+          </p:cNvSpPr>
+          <p:nvPr>
+            <p:ph type="body" sz="quarter" idx="17"/>
+          </p:nvPr>
+        </p:nvSpPr>
+        <p:spPr>
+          <a:xfrm>
+            <a:off x="341088" y="967741"/>
+            <a:ext cx="8364762" cy="3751898"/>
+          </a:xfrm>
+        </p:spPr>
+        <p:txBody>
+          <a:bodyPr/>
+          <a:lstStyle/>
+          <a:p>
+            <a:endParaRPr lang="en-US" sz="2400" dirty="0"/>
+          </a:p>
+        </p:txBody>
+      </p:sp>
+      <p:sp>
+        <p:nvSpPr>
+          <p:cNvPr id="4" name="Title 3"/>
+          <p:cNvSpPr>
+            <a:spLocks noGrp="1"/>
+          </p:cNvSpPr>
+          <p:nvPr>
+            <p:ph type="ctrTitle"/>
+          </p:nvPr>
+        </p:nvSpPr>
+        <p:spPr/>
+        <p:txBody>
+          <a:bodyPr/>
+          <a:lstStyle/>
+          <a:p>
+            <a:r>
+              <a:rPr lang="en-US" sz="3200" dirty="0" smtClean="0">
+                <a:solidFill>
+                  <a:schemeClr val="accent2">
+                    <a:lumMod val="75000"/>
+                  </a:schemeClr>
+                </a:solidFill>
+              </a:rPr>
+              <a:t>Conclusion</a:t>
+            </a:r>
+            <a:endParaRPr lang="en-US" sz="3200" dirty="0">
+              <a:solidFill>
+                <a:schemeClr val="accent2">
+                  <a:lumMod val="75000"/>
+                </a:schemeClr>
+              </a:solidFill>
+            </a:endParaRPr>
+          </a:p>
+        </p:txBody>
+      </p:sp>
+      <p:sp>
+        <p:nvSpPr>
+          <p:cNvPr id="7" name="Slide Number Placeholder 6"/>
+          <p:cNvSpPr>
+            <a:spLocks noGrp="1"/>
+          </p:cNvSpPr>
+          <p:nvPr>
+            <p:ph type="sldNum" sz="quarter" idx="20"/>
+          </p:nvPr>
+        </p:nvSpPr>
+        <p:spPr/>
+        <p:txBody>
+          <a:bodyPr/>
+          <a:lstStyle/>
+          <a:p>
+            <a:fld id="{95819BC3-7E48-734B-B255-F05E5B733943}" type="slidenum">
+              <a:rPr lang="en-US" smtClean="0"/>
+              <a:pPr/>
+              <a:t>28</a:t>
+            </a:fld>
+            <a:endParaRPr lang="en-US"/>
+          </a:p>
+        </p:txBody>
+      </p:sp>
+      <p:sp>
+        <p:nvSpPr>
+          <p:cNvPr id="8" name="Footer Placeholder 5"/>
+          <p:cNvSpPr>
+            <a:spLocks noGrp="1"/>
+          </p:cNvSpPr>
+          <p:nvPr>
+            <p:ph type="dt" sz="half" idx="18"/>
+          </p:nvPr>
+        </p:nvSpPr>
+        <p:spPr/>
+        <p:txBody>
+          <a:bodyPr/>
+          <a:lstStyle/>
+          <a:p>
+            <a:r>
+              <a:rPr lang="en-US" dirty="0" smtClean="0"/>
+              <a:t>May 23, 2017</a:t>
+            </a:r>
+          </a:p>
+          <a:p>
+            <a:endParaRPr lang="en-US" dirty="0"/>
+          </a:p>
+        </p:txBody>
+      </p:sp>
+    </p:spTree>
+  </p:cSld>
+  <p:clrMapOvr>
+    <a:masterClrMapping/>
+  </p:clrMapOvr>
+</p:sld>
+</file>
+
+<file path=ppt/slides/slide29.xml><?xml version="1.0" encoding="utf-8"?>
+<p:sld xmlns:a="http://schemas.openxmlformats.org/drawingml/2006/main" xmlns:r="http://schemas.openxmlformats.org/officeDocument/2006/relationships" xmlns:p="http://schemas.openxmlformats.org/presentationml/2006/main">
+  <p:cSld>
+    <p:spTree>
+      <p:nvGrpSpPr>
+        <p:cNvPr id="1" name=""/>
+        <p:cNvGrpSpPr/>
+        <p:nvPr/>
+      </p:nvGrpSpPr>
+      <p:grpSpPr>
+        <a:xfrm>
+          <a:off x="0" y="0"/>
+          <a:ext cx="0" cy="0"/>
+          <a:chOff x="0" y="0"/>
+          <a:chExt cx="0" cy="0"/>
+        </a:xfrm>
+      </p:grpSpPr>
+      <p:sp>
+        <p:nvSpPr>
+          <p:cNvPr id="2" name="Text Placeholder 1"/>
+          <p:cNvSpPr>
+            <a:spLocks noGrp="1"/>
+          </p:cNvSpPr>
+          <p:nvPr>
+            <p:ph type="body" sz="quarter" idx="17"/>
+          </p:nvPr>
+        </p:nvSpPr>
+        <p:spPr>
+          <a:xfrm>
+            <a:off x="341088" y="967741"/>
+            <a:ext cx="8364762" cy="3751898"/>
+          </a:xfrm>
+        </p:spPr>
+        <p:txBody>
+          <a:bodyPr/>
+          <a:lstStyle/>
+          <a:p>
+            <a:endParaRPr lang="en-US" sz="2400" dirty="0"/>
+          </a:p>
+        </p:txBody>
+      </p:sp>
+      <p:sp>
+        <p:nvSpPr>
+          <p:cNvPr id="4" name="Title 3"/>
+          <p:cNvSpPr>
+            <a:spLocks noGrp="1"/>
+          </p:cNvSpPr>
+          <p:nvPr>
+            <p:ph type="ctrTitle"/>
+          </p:nvPr>
+        </p:nvSpPr>
+        <p:spPr/>
+        <p:txBody>
+          <a:bodyPr/>
+          <a:lstStyle/>
+          <a:p>
+            <a:r>
+              <a:rPr lang="en-US" sz="3200" dirty="0" smtClean="0"/>
+              <a:t>Things we learned</a:t>
+            </a:r>
+            <a:endParaRPr lang="en-US" sz="3200" dirty="0"/>
+          </a:p>
+        </p:txBody>
+      </p:sp>
+      <p:sp>
+        <p:nvSpPr>
+          <p:cNvPr id="7" name="Slide Number Placeholder 6"/>
+          <p:cNvSpPr>
+            <a:spLocks noGrp="1"/>
+          </p:cNvSpPr>
+          <p:nvPr>
+            <p:ph type="sldNum" sz="quarter" idx="20"/>
+          </p:nvPr>
+        </p:nvSpPr>
+        <p:spPr/>
+        <p:txBody>
+          <a:bodyPr/>
+          <a:lstStyle/>
+          <a:p>
+            <a:fld id="{95819BC3-7E48-734B-B255-F05E5B733943}" type="slidenum">
+              <a:rPr lang="en-US" smtClean="0"/>
+              <a:pPr/>
+              <a:t>29</a:t>
+            </a:fld>
+            <a:endParaRPr lang="en-US"/>
+          </a:p>
+        </p:txBody>
+      </p:sp>
+      <p:sp>
+        <p:nvSpPr>
+          <p:cNvPr id="8" name="Footer Placeholder 5"/>
+          <p:cNvSpPr>
+            <a:spLocks noGrp="1"/>
+          </p:cNvSpPr>
+          <p:nvPr>
+            <p:ph type="dt" sz="half" idx="18"/>
+          </p:nvPr>
+        </p:nvSpPr>
+        <p:spPr/>
+        <p:txBody>
+          <a:bodyPr/>
+          <a:lstStyle/>
+          <a:p>
+            <a:r>
+              <a:rPr lang="en-US" dirty="0" smtClean="0"/>
+              <a:t>May 23, 2017</a:t>
+            </a:r>
+          </a:p>
+          <a:p>
+            <a:endParaRPr lang="en-US" dirty="0"/>
+          </a:p>
+        </p:txBody>
+      </p:sp>
+    </p:spTree>
+  </p:cSld>
+  <p:clrMapOvr>
+    <a:masterClrMapping/>
+  </p:clrMapOvr>
+</p:sld>
+</file>
+
+<file path=ppt/slides/slide3.xml><?xml version="1.0" encoding="utf-8"?>
+<p:sld xmlns:a="http://schemas.openxmlformats.org/drawingml/2006/main" xmlns:r="http://schemas.openxmlformats.org/officeDocument/2006/relationships" xmlns:p="http://schemas.openxmlformats.org/presentationml/2006/main">
+  <p:cSld>
+    <p:spTree>
+      <p:nvGrpSpPr>
+        <p:cNvPr id="1" name=""/>
+        <p:cNvGrpSpPr/>
+        <p:nvPr/>
+      </p:nvGrpSpPr>
+      <p:grpSpPr>
+        <a:xfrm>
+          <a:off x="0" y="0"/>
+          <a:ext cx="0" cy="0"/>
+          <a:chOff x="0" y="0"/>
+          <a:chExt cx="0" cy="0"/>
+        </a:xfrm>
+      </p:grpSpPr>
+      <p:sp>
+        <p:nvSpPr>
+          <p:cNvPr id="10" name="Text Placeholder 9"/>
+          <p:cNvSpPr>
+            <a:spLocks noGrp="1"/>
+          </p:cNvSpPr>
+          <p:nvPr>
+            <p:ph type="body" sz="quarter" idx="14"/>
+          </p:nvPr>
+        </p:nvSpPr>
+        <p:spPr>
+          <a:xfrm>
+            <a:off x="341088" y="876301"/>
+            <a:ext cx="8364762" cy="3843338"/>
+          </a:xfrm>
+        </p:spPr>
+        <p:txBody>
+          <a:bodyPr/>
+          <a:lstStyle/>
+          <a:p>
+            <a:pPr>
+              <a:buFont typeface="Arial" pitchFamily="34" charset="0"/>
+              <a:buChar char="•"/>
+            </a:pPr>
+            <a:r>
+              <a:rPr lang="en-US" sz="2400" dirty="0" smtClean="0"/>
+              <a:t> </a:t>
+            </a:r>
+            <a:r>
+              <a:rPr lang="en-US" sz="2400" dirty="0" err="1" smtClean="0"/>
+              <a:t>SuPro</a:t>
+            </a:r>
+            <a:r>
+              <a:rPr lang="en-US" sz="2400" dirty="0" smtClean="0"/>
+              <a:t> is a Prism-hosted real-time </a:t>
+            </a:r>
+          </a:p>
+          <a:p>
+            <a:pPr>
+              <a:buNone/>
+            </a:pPr>
+            <a:r>
+              <a:rPr lang="en-US" sz="2400" dirty="0" smtClean="0"/>
+              <a:t>   Supervisor dashboard </a:t>
+            </a:r>
+          </a:p>
+          <a:p>
+            <a:pPr>
+              <a:buFont typeface="Arial" pitchFamily="34" charset="0"/>
+              <a:buChar char="•"/>
+            </a:pPr>
+            <a:r>
+              <a:rPr lang="en-US" sz="2400" dirty="0" smtClean="0"/>
+              <a:t> Used for monitoring and managing </a:t>
+            </a:r>
+          </a:p>
+          <a:p>
+            <a:pPr>
+              <a:buNone/>
+            </a:pPr>
+            <a:r>
+              <a:rPr lang="en-US" sz="2400" dirty="0" smtClean="0"/>
+              <a:t>   processes running across an </a:t>
+            </a:r>
+          </a:p>
+          <a:p>
+            <a:pPr>
+              <a:buNone/>
+            </a:pPr>
+            <a:r>
+              <a:rPr lang="en-US" sz="2400" dirty="0" smtClean="0"/>
+              <a:t>   autonomous fleet.</a:t>
+            </a:r>
+          </a:p>
+          <a:p>
+            <a:pPr>
+              <a:buFont typeface="Arial" pitchFamily="34" charset="0"/>
+              <a:buChar char="•"/>
+            </a:pPr>
+            <a:r>
+              <a:rPr lang="en-US" sz="2400" dirty="0" smtClean="0"/>
+              <a:t> </a:t>
+            </a:r>
+            <a:r>
+              <a:rPr lang="en-US" sz="2400" dirty="0" err="1" smtClean="0"/>
+              <a:t>SuPro</a:t>
+            </a:r>
+            <a:r>
+              <a:rPr lang="en-US" sz="2400" dirty="0" smtClean="0"/>
+              <a:t> allows the user the ability to track and </a:t>
+            </a:r>
+          </a:p>
+          <a:p>
+            <a:pPr>
+              <a:buNone/>
+            </a:pPr>
+            <a:r>
+              <a:rPr lang="en-US" sz="2400" dirty="0" smtClean="0"/>
+              <a:t>   control multiple supervisor servers</a:t>
+            </a:r>
+          </a:p>
+        </p:txBody>
+      </p:sp>
+      <p:sp>
+        <p:nvSpPr>
+          <p:cNvPr id="8" name="Title 7"/>
+          <p:cNvSpPr>
+            <a:spLocks noGrp="1"/>
+          </p:cNvSpPr>
+          <p:nvPr>
+            <p:ph type="ctrTitle"/>
+          </p:nvPr>
+        </p:nvSpPr>
+        <p:spPr/>
+        <p:txBody>
+          <a:bodyPr/>
+          <a:lstStyle/>
+          <a:p>
+            <a:r>
+              <a:rPr lang="en-US" sz="3200" dirty="0" smtClean="0">
+                <a:solidFill>
+                  <a:schemeClr val="accent2">
+                    <a:lumMod val="75000"/>
+                  </a:schemeClr>
+                </a:solidFill>
+              </a:rPr>
+              <a:t>Introduction to </a:t>
+            </a:r>
+            <a:r>
+              <a:rPr lang="en-US" sz="3200" dirty="0" err="1" smtClean="0">
+                <a:solidFill>
+                  <a:schemeClr val="accent2">
+                    <a:lumMod val="75000"/>
+                  </a:schemeClr>
+                </a:solidFill>
+              </a:rPr>
+              <a:t>SuPro</a:t>
+            </a:r>
+            <a:endParaRPr lang="en-US" sz="3200" dirty="0">
+              <a:solidFill>
+                <a:schemeClr val="accent2">
+                  <a:lumMod val="75000"/>
+                </a:schemeClr>
+              </a:solidFill>
+            </a:endParaRPr>
+          </a:p>
+        </p:txBody>
+      </p:sp>
+      <p:sp>
+        <p:nvSpPr>
+          <p:cNvPr id="5" name="Date Placeholder 4"/>
+          <p:cNvSpPr>
+            <a:spLocks noGrp="1"/>
+          </p:cNvSpPr>
+          <p:nvPr>
+            <p:ph type="dt" sz="half" idx="18"/>
+          </p:nvPr>
+        </p:nvSpPr>
+        <p:spPr/>
+        <p:txBody>
+          <a:bodyPr/>
+          <a:lstStyle/>
+          <a:p>
+            <a:r>
+              <a:rPr lang="en-US" dirty="0" smtClean="0"/>
+              <a:t>May 23, 2017</a:t>
+            </a:r>
+            <a:endParaRPr lang="en-US" dirty="0"/>
+          </a:p>
+        </p:txBody>
+      </p:sp>
+      <p:sp>
+        <p:nvSpPr>
+          <p:cNvPr id="7" name="Slide Number Placeholder 6"/>
+          <p:cNvSpPr>
+            <a:spLocks noGrp="1"/>
+          </p:cNvSpPr>
+          <p:nvPr>
+            <p:ph type="sldNum" sz="quarter" idx="20"/>
+          </p:nvPr>
+        </p:nvSpPr>
+        <p:spPr/>
+        <p:txBody>
+          <a:bodyPr/>
+          <a:lstStyle/>
+          <a:p>
+            <a:fld id="{95819BC3-7E48-734B-B255-F05E5B733943}" type="slidenum">
+              <a:rPr lang="en-US" smtClean="0"/>
+              <a:pPr/>
+              <a:t>3</a:t>
+            </a:fld>
+            <a:endParaRPr lang="en-US" dirty="0"/>
+          </a:p>
+        </p:txBody>
+      </p:sp>
+      <p:pic>
+        <p:nvPicPr>
+          <p:cNvPr id="11" name="Picture 10" descr="supro.png"/>
+          <p:cNvPicPr>
+            <a:picLocks noChangeAspect="1"/>
+          </p:cNvPicPr>
+          <p:nvPr/>
+        </p:nvPicPr>
+        <p:blipFill>
+          <a:blip r:embed="rId2"/>
+          <a:stretch>
+            <a:fillRect/>
+          </a:stretch>
+        </p:blipFill>
+        <p:spPr>
+          <a:xfrm>
+            <a:off x="5800725" y="714119"/>
+            <a:ext cx="2905125" cy="1771650"/>
+          </a:xfrm>
+          <a:prstGeom prst="rect">
+            <a:avLst/>
+          </a:prstGeom>
+        </p:spPr>
+      </p:pic>
+    </p:spTree>
+    <p:extLst>
+      <p:ext uri="{BB962C8B-B14F-4D97-AF65-F5344CB8AC3E}">
+        <p14:creationId xmlns:p14="http://schemas.microsoft.com/office/powerpoint/2010/main" xmlns="" val="2556845147"/>
+      </p:ext>
+    </p:extLst>
+  </p:cSld>
+  <p:clrMapOvr>
+    <a:masterClrMapping/>
+  </p:clrMapOvr>
+  <p:timing>
+    <p:tnLst>
+      <p:par>
+        <p:cTn id="1" dur="indefinite" restart="never" nodeType="tmRoot"/>
+      </p:par>
+    </p:tnLst>
+  </p:timing>
+</p:sld>
+</file>
+
+<file path=ppt/slides/slide30.xml><?xml version="1.0" encoding="utf-8"?>
+<p:sld xmlns:a="http://schemas.openxmlformats.org/drawingml/2006/main" xmlns:r="http://schemas.openxmlformats.org/officeDocument/2006/relationships" xmlns:p="http://schemas.openxmlformats.org/presentationml/2006/main">
+  <p:cSld>
+    <p:spTree>
+      <p:nvGrpSpPr>
+        <p:cNvPr id="1" name=""/>
+        <p:cNvGrpSpPr/>
+        <p:nvPr/>
+      </p:nvGrpSpPr>
+      <p:grpSpPr>
+        <a:xfrm>
+          <a:off x="0" y="0"/>
+          <a:ext cx="0" cy="0"/>
+          <a:chOff x="0" y="0"/>
+          <a:chExt cx="0" cy="0"/>
+        </a:xfrm>
+      </p:grpSpPr>
+      <p:sp>
+        <p:nvSpPr>
+          <p:cNvPr id="2" name="Text Placeholder 1"/>
+          <p:cNvSpPr>
+            <a:spLocks noGrp="1"/>
+          </p:cNvSpPr>
+          <p:nvPr>
+            <p:ph type="body" sz="quarter" idx="17"/>
+          </p:nvPr>
+        </p:nvSpPr>
+        <p:spPr>
+          <a:xfrm>
+            <a:off x="341088" y="967741"/>
+            <a:ext cx="8364762" cy="3751898"/>
+          </a:xfrm>
+        </p:spPr>
+        <p:txBody>
+          <a:bodyPr/>
+          <a:lstStyle/>
+          <a:p>
+            <a:endParaRPr lang="en-US" sz="2400" dirty="0"/>
+          </a:p>
+        </p:txBody>
+      </p:sp>
+      <p:sp>
+        <p:nvSpPr>
+          <p:cNvPr id="4" name="Title 3"/>
+          <p:cNvSpPr>
+            <a:spLocks noGrp="1"/>
+          </p:cNvSpPr>
+          <p:nvPr>
+            <p:ph type="ctrTitle"/>
+          </p:nvPr>
+        </p:nvSpPr>
+        <p:spPr/>
+        <p:txBody>
+          <a:bodyPr/>
+          <a:lstStyle/>
+          <a:p>
+            <a:r>
+              <a:rPr lang="en-US" sz="3200" dirty="0" smtClean="0"/>
+              <a:t>Challenges we faced</a:t>
+            </a:r>
+            <a:endParaRPr lang="en-US" sz="3200" dirty="0"/>
+          </a:p>
+        </p:txBody>
+      </p:sp>
+      <p:sp>
+        <p:nvSpPr>
+          <p:cNvPr id="7" name="Slide Number Placeholder 6"/>
+          <p:cNvSpPr>
+            <a:spLocks noGrp="1"/>
+          </p:cNvSpPr>
+          <p:nvPr>
+            <p:ph type="sldNum" sz="quarter" idx="20"/>
+          </p:nvPr>
+        </p:nvSpPr>
+        <p:spPr/>
+        <p:txBody>
+          <a:bodyPr/>
+          <a:lstStyle/>
+          <a:p>
+            <a:fld id="{95819BC3-7E48-734B-B255-F05E5B733943}" type="slidenum">
+              <a:rPr lang="en-US" smtClean="0"/>
+              <a:pPr/>
+              <a:t>30</a:t>
+            </a:fld>
+            <a:endParaRPr lang="en-US"/>
+          </a:p>
+        </p:txBody>
+      </p:sp>
+      <p:sp>
+        <p:nvSpPr>
+          <p:cNvPr id="8" name="Footer Placeholder 5"/>
+          <p:cNvSpPr>
+            <a:spLocks noGrp="1"/>
+          </p:cNvSpPr>
+          <p:nvPr>
+            <p:ph type="dt" sz="half" idx="18"/>
+          </p:nvPr>
+        </p:nvSpPr>
+        <p:spPr/>
+        <p:txBody>
+          <a:bodyPr/>
+          <a:lstStyle/>
+          <a:p>
+            <a:r>
+              <a:rPr lang="en-US" dirty="0" smtClean="0"/>
+              <a:t>May 23, 2017</a:t>
+            </a:r>
+          </a:p>
+          <a:p>
+            <a:endParaRPr lang="en-US" dirty="0"/>
+          </a:p>
+        </p:txBody>
+      </p:sp>
+    </p:spTree>
+  </p:cSld>
+  <p:clrMapOvr>
+    <a:masterClrMapping/>
+  </p:clrMapOvr>
+</p:sld>
+</file>
+
+<file path=ppt/slides/slide31.xml><?xml version="1.0" encoding="utf-8"?>
+<p:sld xmlns:a="http://schemas.openxmlformats.org/drawingml/2006/main" xmlns:r="http://schemas.openxmlformats.org/officeDocument/2006/relationships" xmlns:p="http://schemas.openxmlformats.org/presentationml/2006/main">
+  <p:cSld>
+    <p:spTree>
+      <p:nvGrpSpPr>
+        <p:cNvPr id="1" name=""/>
+        <p:cNvGrpSpPr/>
+        <p:nvPr/>
+      </p:nvGrpSpPr>
+      <p:grpSpPr>
+        <a:xfrm>
+          <a:off x="0" y="0"/>
+          <a:ext cx="0" cy="0"/>
+          <a:chOff x="0" y="0"/>
+          <a:chExt cx="0" cy="0"/>
+        </a:xfrm>
+      </p:grpSpPr>
+      <p:sp>
+        <p:nvSpPr>
+          <p:cNvPr id="2" name="Text Placeholder 1"/>
+          <p:cNvSpPr>
+            <a:spLocks noGrp="1"/>
+          </p:cNvSpPr>
+          <p:nvPr>
+            <p:ph type="body" sz="quarter" idx="17"/>
+          </p:nvPr>
+        </p:nvSpPr>
+        <p:spPr>
+          <a:xfrm>
+            <a:off x="341088" y="967741"/>
+            <a:ext cx="8364762" cy="3751898"/>
+          </a:xfrm>
+        </p:spPr>
+        <p:txBody>
+          <a:bodyPr/>
+          <a:lstStyle/>
+          <a:p>
+            <a:endParaRPr lang="en-US" sz="2400" dirty="0"/>
+          </a:p>
+        </p:txBody>
+      </p:sp>
+      <p:sp>
+        <p:nvSpPr>
+          <p:cNvPr id="4" name="Title 3"/>
+          <p:cNvSpPr>
+            <a:spLocks noGrp="1"/>
+          </p:cNvSpPr>
+          <p:nvPr>
+            <p:ph type="ctrTitle"/>
+          </p:nvPr>
+        </p:nvSpPr>
+        <p:spPr/>
+        <p:txBody>
+          <a:bodyPr/>
+          <a:lstStyle/>
+          <a:p>
+            <a:r>
+              <a:rPr lang="en-US" sz="3200" dirty="0" smtClean="0"/>
+              <a:t>Final thoughts</a:t>
+            </a:r>
+            <a:endParaRPr lang="en-US" sz="3200" dirty="0"/>
+          </a:p>
+        </p:txBody>
+      </p:sp>
+      <p:sp>
+        <p:nvSpPr>
+          <p:cNvPr id="7" name="Slide Number Placeholder 6"/>
+          <p:cNvSpPr>
+            <a:spLocks noGrp="1"/>
+          </p:cNvSpPr>
+          <p:nvPr>
+            <p:ph type="sldNum" sz="quarter" idx="20"/>
+          </p:nvPr>
+        </p:nvSpPr>
+        <p:spPr/>
+        <p:txBody>
+          <a:bodyPr/>
+          <a:lstStyle/>
+          <a:p>
+            <a:fld id="{95819BC3-7E48-734B-B255-F05E5B733943}" type="slidenum">
+              <a:rPr lang="en-US" smtClean="0"/>
+              <a:pPr/>
+              <a:t>31</a:t>
+            </a:fld>
+            <a:endParaRPr lang="en-US"/>
+          </a:p>
+        </p:txBody>
+      </p:sp>
+      <p:sp>
+        <p:nvSpPr>
+          <p:cNvPr id="8" name="Footer Placeholder 5"/>
+          <p:cNvSpPr>
+            <a:spLocks noGrp="1"/>
+          </p:cNvSpPr>
+          <p:nvPr>
+            <p:ph type="dt" sz="half" idx="18"/>
+          </p:nvPr>
+        </p:nvSpPr>
+        <p:spPr/>
+        <p:txBody>
+          <a:bodyPr/>
+          <a:lstStyle/>
+          <a:p>
+            <a:r>
+              <a:rPr lang="en-US" dirty="0" smtClean="0"/>
+              <a:t>May 23, 2017</a:t>
+            </a:r>
+          </a:p>
+          <a:p>
+            <a:endParaRPr lang="en-US" dirty="0"/>
+          </a:p>
+        </p:txBody>
+      </p:sp>
+    </p:spTree>
+  </p:cSld>
+  <p:clrMapOvr>
+    <a:masterClrMapping/>
+  </p:clrMapOvr>
+</p:sld>
+</file>
+
+<file path=ppt/slides/slide32.xml><?xml version="1.0" encoding="utf-8"?>
+<p:sld xmlns:a="http://schemas.openxmlformats.org/drawingml/2006/main" xmlns:r="http://schemas.openxmlformats.org/officeDocument/2006/relationships" xmlns:p="http://schemas.openxmlformats.org/presentationml/2006/main">
+  <p:cSld>
+    <p:spTree>
+      <p:nvGrpSpPr>
+        <p:cNvPr id="1" name=""/>
+        <p:cNvGrpSpPr/>
+        <p:nvPr/>
+      </p:nvGrpSpPr>
+      <p:grpSpPr>
+        <a:xfrm>
+          <a:off x="0" y="0"/>
+          <a:ext cx="0" cy="0"/>
+          <a:chOff x="0" y="0"/>
+          <a:chExt cx="0" cy="0"/>
+        </a:xfrm>
+      </p:grpSpPr>
+      <p:sp>
+        <p:nvSpPr>
+          <p:cNvPr id="2" name="Text Placeholder 1"/>
+          <p:cNvSpPr>
+            <a:spLocks noGrp="1"/>
+          </p:cNvSpPr>
+          <p:nvPr>
+            <p:ph type="body" sz="quarter" idx="17"/>
+          </p:nvPr>
+        </p:nvSpPr>
+        <p:spPr>
+          <a:xfrm>
+            <a:off x="341088" y="967741"/>
+            <a:ext cx="8364762" cy="3751898"/>
+          </a:xfrm>
+        </p:spPr>
+        <p:txBody>
+          <a:bodyPr/>
+          <a:lstStyle/>
+          <a:p>
+            <a:endParaRPr lang="en-US" sz="2400" dirty="0"/>
+          </a:p>
+        </p:txBody>
+      </p:sp>
+      <p:sp>
+        <p:nvSpPr>
+          <p:cNvPr id="4" name="Title 3"/>
+          <p:cNvSpPr>
+            <a:spLocks noGrp="1"/>
+          </p:cNvSpPr>
+          <p:nvPr>
+            <p:ph type="ctrTitle"/>
+          </p:nvPr>
+        </p:nvSpPr>
+        <p:spPr/>
+        <p:txBody>
+          <a:bodyPr/>
+          <a:lstStyle/>
+          <a:p>
+            <a:r>
+              <a:rPr lang="en-US" sz="3200" dirty="0" smtClean="0">
+                <a:solidFill>
+                  <a:schemeClr val="accent2">
+                    <a:lumMod val="75000"/>
+                  </a:schemeClr>
+                </a:solidFill>
+              </a:rPr>
+              <a:t>Acknowledgements</a:t>
+            </a:r>
+            <a:endParaRPr lang="en-US" sz="3200" dirty="0">
+              <a:solidFill>
+                <a:schemeClr val="accent2">
+                  <a:lumMod val="75000"/>
+                </a:schemeClr>
+              </a:solidFill>
+            </a:endParaRPr>
+          </a:p>
+        </p:txBody>
+      </p:sp>
+      <p:sp>
+        <p:nvSpPr>
+          <p:cNvPr id="7" name="Slide Number Placeholder 6"/>
+          <p:cNvSpPr>
+            <a:spLocks noGrp="1"/>
+          </p:cNvSpPr>
+          <p:nvPr>
+            <p:ph type="sldNum" sz="quarter" idx="20"/>
+          </p:nvPr>
+        </p:nvSpPr>
+        <p:spPr/>
+        <p:txBody>
+          <a:bodyPr/>
+          <a:lstStyle/>
+          <a:p>
+            <a:fld id="{95819BC3-7E48-734B-B255-F05E5B733943}" type="slidenum">
+              <a:rPr lang="en-US" smtClean="0"/>
+              <a:pPr/>
+              <a:t>32</a:t>
+            </a:fld>
+            <a:endParaRPr lang="en-US"/>
+          </a:p>
+        </p:txBody>
+      </p:sp>
+      <p:sp>
+        <p:nvSpPr>
+          <p:cNvPr id="8" name="Footer Placeholder 5"/>
+          <p:cNvSpPr>
+            <a:spLocks noGrp="1"/>
+          </p:cNvSpPr>
+          <p:nvPr>
+            <p:ph type="dt" sz="half" idx="18"/>
+          </p:nvPr>
+        </p:nvSpPr>
+        <p:spPr/>
+        <p:txBody>
+          <a:bodyPr/>
+          <a:lstStyle/>
+          <a:p>
+            <a:r>
+              <a:rPr lang="en-US" dirty="0" smtClean="0"/>
+              <a:t>May 23, 2017</a:t>
+            </a:r>
+          </a:p>
+          <a:p>
+            <a:endParaRPr lang="en-US" dirty="0"/>
+          </a:p>
+        </p:txBody>
+      </p:sp>
+    </p:spTree>
+  </p:cSld>
+  <p:clrMapOvr>
+    <a:masterClrMapping/>
+  </p:clrMapOvr>
+</p:sld>
+</file>
+
+<file path=ppt/slides/slide33.xml><?xml version="1.0" encoding="utf-8"?>
 <p:sld xmlns:a="http://schemas.openxmlformats.org/drawingml/2006/main" xmlns:r="http://schemas.openxmlformats.org/officeDocument/2006/relationships" xmlns:p="http://schemas.openxmlformats.org/presentationml/2006/main">
   <p:cSld>
     <p:spTree>
@@ -12324,278 +13520,6 @@
 </p:sld>
 </file>
 
-<file path=ppt/slides/slide3.xml><?xml version="1.0" encoding="utf-8"?>
-<p:sld xmlns:a="http://schemas.openxmlformats.org/drawingml/2006/main" xmlns:r="http://schemas.openxmlformats.org/officeDocument/2006/relationships" xmlns:p="http://schemas.openxmlformats.org/presentationml/2006/main">
-  <p:cSld>
-    <p:spTree>
-      <p:nvGrpSpPr>
-        <p:cNvPr id="1" name=""/>
-        <p:cNvGrpSpPr/>
-        <p:nvPr/>
-      </p:nvGrpSpPr>
-      <p:grpSpPr>
-        <a:xfrm>
-          <a:off x="0" y="0"/>
-          <a:ext cx="0" cy="0"/>
-          <a:chOff x="0" y="0"/>
-          <a:chExt cx="0" cy="0"/>
-        </a:xfrm>
-      </p:grpSpPr>
-      <p:sp>
-        <p:nvSpPr>
-          <p:cNvPr id="10" name="Text Placeholder 9"/>
-          <p:cNvSpPr>
-            <a:spLocks noGrp="1"/>
-          </p:cNvSpPr>
-          <p:nvPr>
-            <p:ph type="body" sz="quarter" idx="14"/>
-          </p:nvPr>
-        </p:nvSpPr>
-        <p:spPr>
-          <a:xfrm>
-            <a:off x="341088" y="876301"/>
-            <a:ext cx="8364762" cy="3843338"/>
-          </a:xfrm>
-        </p:spPr>
-        <p:txBody>
-          <a:bodyPr/>
-          <a:lstStyle/>
-          <a:p>
-            <a:pPr>
-              <a:buFont typeface="Arial" pitchFamily="34" charset="0"/>
-              <a:buChar char="•"/>
-            </a:pPr>
-            <a:r>
-              <a:rPr lang="en-US" sz="2400" dirty="0" smtClean="0"/>
-              <a:t> </a:t>
-            </a:r>
-            <a:r>
-              <a:rPr lang="en-US" sz="2400" dirty="0" err="1" smtClean="0"/>
-              <a:t>SuPro</a:t>
-            </a:r>
-            <a:r>
-              <a:rPr lang="en-US" sz="2400" dirty="0" smtClean="0"/>
-              <a:t> is a Prism-hosted real-time </a:t>
-            </a:r>
-          </a:p>
-          <a:p>
-            <a:pPr>
-              <a:buNone/>
-            </a:pPr>
-            <a:r>
-              <a:rPr lang="en-US" sz="2400" dirty="0" smtClean="0"/>
-              <a:t>   Supervisor </a:t>
-            </a:r>
-            <a:r>
-              <a:rPr lang="en-US" sz="2400" dirty="0" smtClean="0"/>
-              <a:t>d</a:t>
-            </a:r>
-            <a:r>
-              <a:rPr lang="en-US" sz="2400" dirty="0" smtClean="0"/>
-              <a:t>ashboard </a:t>
-            </a:r>
-          </a:p>
-          <a:p>
-            <a:pPr>
-              <a:buFont typeface="Arial" pitchFamily="34" charset="0"/>
-              <a:buChar char="•"/>
-            </a:pPr>
-            <a:r>
-              <a:rPr lang="en-US" sz="2400" dirty="0" smtClean="0"/>
-              <a:t> Used for </a:t>
-            </a:r>
-            <a:r>
-              <a:rPr lang="en-US" sz="2400" dirty="0" smtClean="0"/>
-              <a:t>monitoring and managing </a:t>
-            </a:r>
-          </a:p>
-          <a:p>
-            <a:pPr>
-              <a:buNone/>
-            </a:pPr>
-            <a:r>
-              <a:rPr lang="en-US" sz="2400" dirty="0" smtClean="0"/>
-              <a:t>   processes running across an </a:t>
-            </a:r>
-          </a:p>
-          <a:p>
-            <a:pPr>
-              <a:buNone/>
-            </a:pPr>
-            <a:r>
-              <a:rPr lang="en-US" sz="2400" dirty="0" smtClean="0"/>
-              <a:t>   autonomous fleet.</a:t>
-            </a:r>
-          </a:p>
-          <a:p>
-            <a:pPr>
-              <a:buFont typeface="Arial" pitchFamily="34" charset="0"/>
-              <a:buChar char="•"/>
-            </a:pPr>
-            <a:r>
-              <a:rPr lang="en-US" sz="2400" dirty="0" smtClean="0"/>
-              <a:t> </a:t>
-            </a:r>
-            <a:r>
-              <a:rPr lang="en-US" sz="2400" dirty="0" err="1" smtClean="0"/>
-              <a:t>SuPro</a:t>
-            </a:r>
-            <a:r>
-              <a:rPr lang="en-US" sz="2400" dirty="0" smtClean="0"/>
-              <a:t> allows the user the ability to t</a:t>
-            </a:r>
-            <a:r>
-              <a:rPr lang="en-US" sz="2400" dirty="0" smtClean="0"/>
-              <a:t>rack and </a:t>
-            </a:r>
-          </a:p>
-          <a:p>
-            <a:pPr>
-              <a:buNone/>
-            </a:pPr>
-            <a:r>
-              <a:rPr lang="en-US" sz="2400" dirty="0" smtClean="0"/>
-              <a:t>   control multiple supervisor servers</a:t>
-            </a:r>
-          </a:p>
-        </p:txBody>
-      </p:sp>
-      <p:sp>
-        <p:nvSpPr>
-          <p:cNvPr id="8" name="Title 7"/>
-          <p:cNvSpPr>
-            <a:spLocks noGrp="1"/>
-          </p:cNvSpPr>
-          <p:nvPr>
-            <p:ph type="ctrTitle"/>
-          </p:nvPr>
-        </p:nvSpPr>
-        <p:spPr/>
-        <p:txBody>
-          <a:bodyPr/>
-          <a:lstStyle/>
-          <a:p>
-            <a:r>
-              <a:rPr lang="en-US" sz="3200" dirty="0" smtClean="0">
-                <a:solidFill>
-                  <a:schemeClr val="accent2">
-                    <a:lumMod val="75000"/>
-                  </a:schemeClr>
-                </a:solidFill>
-              </a:rPr>
-              <a:t>Introduction to </a:t>
-            </a:r>
-            <a:r>
-              <a:rPr lang="en-US" sz="3200" dirty="0" err="1" smtClean="0">
-                <a:solidFill>
-                  <a:schemeClr val="accent2">
-                    <a:lumMod val="75000"/>
-                  </a:schemeClr>
-                </a:solidFill>
-              </a:rPr>
-              <a:t>SuPro</a:t>
-            </a:r>
-            <a:endParaRPr lang="en-US" sz="3200" dirty="0">
-              <a:solidFill>
-                <a:schemeClr val="accent2">
-                  <a:lumMod val="75000"/>
-                </a:schemeClr>
-              </a:solidFill>
-            </a:endParaRPr>
-          </a:p>
-        </p:txBody>
-      </p:sp>
-      <p:sp>
-        <p:nvSpPr>
-          <p:cNvPr id="5" name="Date Placeholder 4"/>
-          <p:cNvSpPr>
-            <a:spLocks noGrp="1"/>
-          </p:cNvSpPr>
-          <p:nvPr>
-            <p:ph type="dt" sz="half" idx="18"/>
-          </p:nvPr>
-        </p:nvSpPr>
-        <p:spPr/>
-        <p:txBody>
-          <a:bodyPr/>
-          <a:lstStyle/>
-          <a:p>
-            <a:r>
-              <a:rPr lang="en-US" dirty="0" smtClean="0"/>
-              <a:t>May 23, 2017</a:t>
-            </a:r>
-            <a:endParaRPr lang="en-US" dirty="0"/>
-          </a:p>
-        </p:txBody>
-      </p:sp>
-      <p:sp>
-        <p:nvSpPr>
-          <p:cNvPr id="7" name="Slide Number Placeholder 6"/>
-          <p:cNvSpPr>
-            <a:spLocks noGrp="1"/>
-          </p:cNvSpPr>
-          <p:nvPr>
-            <p:ph type="sldNum" sz="quarter" idx="20"/>
-          </p:nvPr>
-        </p:nvSpPr>
-        <p:spPr/>
-        <p:txBody>
-          <a:bodyPr/>
-          <a:lstStyle/>
-          <a:p>
-            <a:fld id="{95819BC3-7E48-734B-B255-F05E5B733943}" type="slidenum">
-              <a:rPr lang="en-US" smtClean="0"/>
-              <a:pPr/>
-              <a:t>3</a:t>
-            </a:fld>
-            <a:endParaRPr lang="en-US" dirty="0"/>
-          </a:p>
-        </p:txBody>
-      </p:sp>
-      <p:pic>
-        <p:nvPicPr>
-          <p:cNvPr id="11" name="Picture 10" descr="supro.png"/>
-          <p:cNvPicPr>
-            <a:picLocks noChangeAspect="1"/>
-          </p:cNvPicPr>
-          <p:nvPr/>
-        </p:nvPicPr>
-        <p:blipFill>
-          <a:blip r:embed="rId2"/>
-          <a:stretch>
-            <a:fillRect/>
-          </a:stretch>
-        </p:blipFill>
-        <p:spPr>
-          <a:xfrm>
-            <a:off x="5800725" y="714119"/>
-            <a:ext cx="2905125" cy="1771650"/>
-          </a:xfrm>
-          <a:prstGeom prst="rect">
-            <a:avLst/>
-          </a:prstGeom>
-        </p:spPr>
-      </p:pic>
-    </p:spTree>
-    <p:extLst>
-      <p:ext uri="{BB962C8B-B14F-4D97-AF65-F5344CB8AC3E}">
-        <p14:creationId xmlns:p14="http://schemas.microsoft.com/office/powerpoint/2010/main" xmlns="" val="2556845147"/>
-      </p:ext>
-    </p:extLst>
-  </p:cSld>
-  <p:clrMapOvr>
-    <a:masterClrMapping/>
-  </p:clrMapOvr>
-  <p:timing>
-    <p:tnLst>
-      <p:par>
-        <p:cTn id="1" dur="indefinite" restart="never" nodeType="tmRoot"/>
-      </p:par>
-    </p:tnLst>
-  </p:timing>
-</p:sld>
-</file>
-
 <file path=ppt/slides/slide4.xml><?xml version="1.0" encoding="utf-8"?>
 <p:sld xmlns:a="http://schemas.openxmlformats.org/drawingml/2006/main" xmlns:r="http://schemas.openxmlformats.org/officeDocument/2006/relationships" xmlns:p="http://schemas.openxmlformats.org/presentationml/2006/main">
   <p:cSld>
@@ -12905,15 +13829,37 @@
         </p:nvSpPr>
         <p:spPr>
           <a:xfrm>
-            <a:off x="341088" y="967741"/>
-            <a:ext cx="8364762" cy="3751898"/>
-          </a:xfrm>
-        </p:spPr>
-        <p:txBody>
-          <a:bodyPr/>
-          <a:lstStyle/>
-          <a:p>
-            <a:endParaRPr lang="en-US" sz="2400" dirty="0"/>
+            <a:off x="341088" y="1478279"/>
+            <a:ext cx="8364762" cy="3241359"/>
+          </a:xfrm>
+        </p:spPr>
+        <p:txBody>
+          <a:bodyPr/>
+          <a:lstStyle/>
+          <a:p>
+            <a:r>
+              <a:rPr lang="en-US" sz="2800" dirty="0" smtClean="0"/>
+              <a:t>Web Sockets</a:t>
+            </a:r>
+          </a:p>
+          <a:p>
+            <a:r>
+              <a:rPr lang="en-US" sz="2800" dirty="0" smtClean="0"/>
+              <a:t>Multithreaded Programming</a:t>
+            </a:r>
+          </a:p>
+          <a:p>
+            <a:r>
+              <a:rPr lang="en-US" sz="2800" dirty="0" smtClean="0"/>
+              <a:t>Queues</a:t>
+            </a:r>
+          </a:p>
+          <a:p>
+            <a:r>
+              <a:rPr lang="en-US" sz="2800" dirty="0" smtClean="0"/>
+              <a:t>JSON</a:t>
+            </a:r>
+            <a:endParaRPr lang="en-US" sz="2800" dirty="0"/>
           </a:p>
         </p:txBody>
       </p:sp>
@@ -13040,6 +13986,38 @@
           <a:bodyPr/>
           <a:lstStyle/>
           <a:p>
+            <a:r>
+              <a:rPr lang="en-US" sz="2400" dirty="0" smtClean="0"/>
+              <a:t>Web Sockets makes it possible to open an interactive session between the user’s browser and a server.</a:t>
+            </a:r>
+          </a:p>
+          <a:p>
+            <a:r>
+              <a:rPr lang="en-US" sz="2400" dirty="0" smtClean="0"/>
+              <a:t>With Web Sockets you can send messages to a server and receive event driven responses without having to poll the server for a reply. </a:t>
+            </a:r>
+          </a:p>
+          <a:p>
+            <a:r>
+              <a:rPr lang="en-US" sz="2400" dirty="0" smtClean="0"/>
+              <a:t>We use a web socket to connect the </a:t>
+            </a:r>
+            <a:r>
+              <a:rPr lang="en-US" sz="2400" dirty="0" err="1" smtClean="0"/>
+              <a:t>Supro</a:t>
+            </a:r>
+            <a:r>
+              <a:rPr lang="en-US" sz="2400" dirty="0" smtClean="0"/>
+              <a:t> backend with web clients opened by users. </a:t>
+            </a:r>
+          </a:p>
+          <a:p>
+            <a:r>
+              <a:rPr lang="en-US" sz="2400" dirty="0" smtClean="0"/>
+              <a:t>Once a web socket connection is established, messages can be sent from the UI to the backend and vice versa.</a:t>
+            </a:r>
+          </a:p>
+          <a:p>
             <a:endParaRPr lang="en-US" sz="2400" dirty="0"/>
           </a:p>
         </p:txBody>
@@ -13180,6 +14158,9 @@
           <a:bodyPr/>
           <a:lstStyle/>
           <a:p>
+            <a:pPr>
+              <a:buNone/>
+            </a:pPr>
             <a:endParaRPr lang="en-US" sz="2400" dirty="0"/>
           </a:p>
         </p:txBody>
@@ -13201,7 +14182,15 @@
           <a:p>
             <a:r>
               <a:rPr lang="en-US" sz="3200" dirty="0" smtClean="0"/>
-              <a:t>Threading</a:t>
+              <a:t>Autobahn Vs. </a:t>
+            </a:r>
+            <a:r>
+              <a:rPr lang="en-US" sz="3200" dirty="0" err="1" smtClean="0"/>
+              <a:t>SockJS</a:t>
+            </a:r>
+            <a:r>
+              <a:rPr lang="en-US" sz="3200" dirty="0" smtClean="0"/>
+              <a:t/>
             </a:r>
             <a:br>
               <a:rPr lang="en-US" sz="3200" dirty="0" smtClean="0"/>
@@ -13304,6 +14293,50 @@
           <a:bodyPr/>
           <a:lstStyle/>
           <a:p>
+            <a:r>
+              <a:rPr lang="en-US" sz="2000" dirty="0" smtClean="0"/>
+              <a:t>Running several threads is similar to running several different programs concurrently, but with the following benefits – </a:t>
+            </a:r>
+          </a:p>
+          <a:p>
+            <a:pPr lvl="1"/>
+            <a:r>
+              <a:rPr lang="en-US" sz="1600" dirty="0" smtClean="0"/>
+              <a:t>Multiple threads within a process share the same data space with the main thread</a:t>
+            </a:r>
+          </a:p>
+          <a:p>
+            <a:pPr lvl="1"/>
+            <a:r>
+              <a:rPr lang="en-US" sz="1600" dirty="0" smtClean="0"/>
+              <a:t>Threads do not require as much memory usage as processes. </a:t>
+            </a:r>
+          </a:p>
+          <a:p>
+            <a:r>
+              <a:rPr lang="en-US" sz="2000" dirty="0" smtClean="0"/>
+              <a:t>Python has a Threading Module that provides high-level support for threads</a:t>
+            </a:r>
+          </a:p>
+          <a:p>
+            <a:r>
+              <a:rPr lang="en-US" sz="2000" dirty="0" smtClean="0"/>
+              <a:t>The threading module has a Thread class that implements threading </a:t>
+            </a:r>
+          </a:p>
+          <a:p>
+            <a:r>
+              <a:rPr lang="en-US" sz="2000" dirty="0" smtClean="0"/>
+              <a:t>We use the run() method from the Thread class which will execute the thread activity.</a:t>
+            </a:r>
+          </a:p>
+          <a:p>
+            <a:endParaRPr lang="en-US" sz="2000" dirty="0" smtClean="0"/>
+          </a:p>
+          <a:p>
+            <a:endParaRPr lang="en-US" sz="2000" dirty="0" smtClean="0"/>
+          </a:p>
+          <a:p>
             <a:endParaRPr lang="en-US" sz="2400" dirty="0"/>
           </a:p>
         </p:txBody>
@@ -13325,7 +14358,7 @@
           <a:p>
             <a:r>
               <a:rPr lang="en-US" sz="3200" dirty="0" smtClean="0"/>
-              <a:t>JSON</a:t>
+              <a:t>Python Multithreaded Programming</a:t>
             </a:r>
             <a:endParaRPr lang="en-US" sz="3200" dirty="0"/>
           </a:p>

</xml_diff>